<commit_message>
Modificacio ppt i backend al word.
</commit_message>
<xml_diff>
--- a/Presentació dawsharing grup4.pptx
+++ b/Presentació dawsharing grup4.pptx
@@ -222,7 +222,7 @@
           <a:p>
             <a:fld id="{7C5D9BB1-BC60-4053-87C7-39E1A8B355C3}" type="datetimeFigureOut">
               <a:rPr lang="ca-ES" smtClean="0"/>
-              <a:t>15/05/2015</a:t>
+              <a:t>21/05/2015</a:t>
             </a:fld>
             <a:endParaRPr lang="ca-ES"/>
           </a:p>
@@ -1296,7 +1296,7 @@
           <a:p>
             <a:fld id="{68A1D7F0-290E-42BC-890A-1EC47D6A0624}" type="datetimeFigureOut">
               <a:rPr lang="es-ES" smtClean="0"/>
-              <a:t>15/05/2015</a:t>
+              <a:t>21/05/2015</a:t>
             </a:fld>
             <a:endParaRPr lang="es-ES"/>
           </a:p>
@@ -1547,7 +1547,7 @@
           <a:p>
             <a:fld id="{68A1D7F0-290E-42BC-890A-1EC47D6A0624}" type="datetimeFigureOut">
               <a:rPr lang="es-ES" smtClean="0"/>
-              <a:t>15/05/2015</a:t>
+              <a:t>21/05/2015</a:t>
             </a:fld>
             <a:endParaRPr lang="es-ES"/>
           </a:p>
@@ -1861,7 +1861,7 @@
           <a:p>
             <a:fld id="{68A1D7F0-290E-42BC-890A-1EC47D6A0624}" type="datetimeFigureOut">
               <a:rPr lang="es-ES" smtClean="0"/>
-              <a:t>15/05/2015</a:t>
+              <a:t>21/05/2015</a:t>
             </a:fld>
             <a:endParaRPr lang="es-ES"/>
           </a:p>
@@ -2202,7 +2202,7 @@
           <a:p>
             <a:fld id="{68A1D7F0-290E-42BC-890A-1EC47D6A0624}" type="datetimeFigureOut">
               <a:rPr lang="es-ES" smtClean="0"/>
-              <a:t>15/05/2015</a:t>
+              <a:t>21/05/2015</a:t>
             </a:fld>
             <a:endParaRPr lang="es-ES"/>
           </a:p>
@@ -2516,7 +2516,7 @@
           <a:p>
             <a:fld id="{68A1D7F0-290E-42BC-890A-1EC47D6A0624}" type="datetimeFigureOut">
               <a:rPr lang="es-ES" smtClean="0"/>
-              <a:t>15/05/2015</a:t>
+              <a:t>21/05/2015</a:t>
             </a:fld>
             <a:endParaRPr lang="es-ES"/>
           </a:p>
@@ -2909,7 +2909,7 @@
           <a:p>
             <a:fld id="{68A1D7F0-290E-42BC-890A-1EC47D6A0624}" type="datetimeFigureOut">
               <a:rPr lang="es-ES" smtClean="0"/>
-              <a:t>15/05/2015</a:t>
+              <a:t>21/05/2015</a:t>
             </a:fld>
             <a:endParaRPr lang="es-ES"/>
           </a:p>
@@ -3079,7 +3079,7 @@
           <a:p>
             <a:fld id="{68A1D7F0-290E-42BC-890A-1EC47D6A0624}" type="datetimeFigureOut">
               <a:rPr lang="es-ES" smtClean="0"/>
-              <a:t>15/05/2015</a:t>
+              <a:t>21/05/2015</a:t>
             </a:fld>
             <a:endParaRPr lang="es-ES"/>
           </a:p>
@@ -3259,7 +3259,7 @@
           <a:p>
             <a:fld id="{68A1D7F0-290E-42BC-890A-1EC47D6A0624}" type="datetimeFigureOut">
               <a:rPr lang="es-ES" smtClean="0"/>
-              <a:t>15/05/2015</a:t>
+              <a:t>21/05/2015</a:t>
             </a:fld>
             <a:endParaRPr lang="es-ES"/>
           </a:p>
@@ -3435,7 +3435,7 @@
           <a:p>
             <a:fld id="{68A1D7F0-290E-42BC-890A-1EC47D6A0624}" type="datetimeFigureOut">
               <a:rPr lang="es-ES" smtClean="0"/>
-              <a:t>15/05/2015</a:t>
+              <a:t>21/05/2015</a:t>
             </a:fld>
             <a:endParaRPr lang="es-ES"/>
           </a:p>
@@ -3682,7 +3682,7 @@
           <a:p>
             <a:fld id="{68A1D7F0-290E-42BC-890A-1EC47D6A0624}" type="datetimeFigureOut">
               <a:rPr lang="es-ES" smtClean="0"/>
-              <a:t>15/05/2015</a:t>
+              <a:t>21/05/2015</a:t>
             </a:fld>
             <a:endParaRPr lang="es-ES"/>
           </a:p>
@@ -3914,7 +3914,7 @@
           <a:p>
             <a:fld id="{68A1D7F0-290E-42BC-890A-1EC47D6A0624}" type="datetimeFigureOut">
               <a:rPr lang="es-ES" smtClean="0"/>
-              <a:t>15/05/2015</a:t>
+              <a:t>21/05/2015</a:t>
             </a:fld>
             <a:endParaRPr lang="es-ES"/>
           </a:p>
@@ -4288,7 +4288,7 @@
           <a:p>
             <a:fld id="{68A1D7F0-290E-42BC-890A-1EC47D6A0624}" type="datetimeFigureOut">
               <a:rPr lang="es-ES" smtClean="0"/>
-              <a:t>15/05/2015</a:t>
+              <a:t>21/05/2015</a:t>
             </a:fld>
             <a:endParaRPr lang="es-ES"/>
           </a:p>
@@ -4411,7 +4411,7 @@
           <a:p>
             <a:fld id="{68A1D7F0-290E-42BC-890A-1EC47D6A0624}" type="datetimeFigureOut">
               <a:rPr lang="es-ES" smtClean="0"/>
-              <a:t>15/05/2015</a:t>
+              <a:t>21/05/2015</a:t>
             </a:fld>
             <a:endParaRPr lang="es-ES"/>
           </a:p>
@@ -4506,7 +4506,7 @@
           <a:p>
             <a:fld id="{68A1D7F0-290E-42BC-890A-1EC47D6A0624}" type="datetimeFigureOut">
               <a:rPr lang="es-ES" smtClean="0"/>
-              <a:t>15/05/2015</a:t>
+              <a:t>21/05/2015</a:t>
             </a:fld>
             <a:endParaRPr lang="es-ES"/>
           </a:p>
@@ -4761,7 +4761,7 @@
           <a:p>
             <a:fld id="{68A1D7F0-290E-42BC-890A-1EC47D6A0624}" type="datetimeFigureOut">
               <a:rPr lang="es-ES" smtClean="0"/>
-              <a:t>15/05/2015</a:t>
+              <a:t>21/05/2015</a:t>
             </a:fld>
             <a:endParaRPr lang="es-ES"/>
           </a:p>
@@ -5024,7 +5024,7 @@
           <a:p>
             <a:fld id="{68A1D7F0-290E-42BC-890A-1EC47D6A0624}" type="datetimeFigureOut">
               <a:rPr lang="es-ES" smtClean="0"/>
-              <a:t>15/05/2015</a:t>
+              <a:t>21/05/2015</a:t>
             </a:fld>
             <a:endParaRPr lang="es-ES"/>
           </a:p>
@@ -5797,7 +5797,7 @@
           <a:p>
             <a:fld id="{68A1D7F0-290E-42BC-890A-1EC47D6A0624}" type="datetimeFigureOut">
               <a:rPr lang="es-ES" smtClean="0"/>
-              <a:t>15/05/2015</a:t>
+              <a:t>21/05/2015</a:t>
             </a:fld>
             <a:endParaRPr lang="es-ES"/>
           </a:p>
@@ -6510,11 +6510,15 @@
             </a:r>
             <a:r>
               <a:rPr lang="ca-ES" sz="2400" dirty="0" err="1" smtClean="0"/>
-              <a:t>Trello</a:t>
+              <a:t>Columner</a:t>
             </a:r>
             <a:r>
               <a:rPr lang="ca-ES" sz="2400" dirty="0" smtClean="0"/>
-              <a:t>, un projecte on la nostra vida s’organitzarà de manera més fàcil.</a:t>
+              <a:t>, </a:t>
+            </a:r>
+            <a:r>
+              <a:rPr lang="ca-ES" sz="2400" dirty="0" smtClean="0"/>
+              <a:t>un projecte on la nostra vida s’organitzarà de manera més fàcil.</a:t>
             </a:r>
             <a:endParaRPr lang="ca-ES" sz="2400" dirty="0"/>
           </a:p>
@@ -6601,12 +6605,20 @@
               <a:buNone/>
             </a:pPr>
             <a:r>
-              <a:rPr lang="ca-ES" dirty="0" err="1"/>
-              <a:t>DawTrello</a:t>
+              <a:rPr lang="ca-ES" dirty="0" err="1" smtClean="0"/>
+              <a:t>DawColumner</a:t>
+            </a:r>
+            <a:r>
+              <a:rPr lang="ca-ES" dirty="0" smtClean="0"/>
+              <a:t> </a:t>
+            </a:r>
+            <a:r>
+              <a:rPr lang="ca-ES" dirty="0" smtClean="0"/>
+              <a:t>es </a:t>
             </a:r>
             <a:r>
               <a:rPr lang="ca-ES" dirty="0"/>
-              <a:t> es basa en una eina de gestió de projectes i de la teva vida personal que fa la organització molt més fàcil i divertida. La realitat es que serveix per a tot, estiguis organitzant un projecte de treball, tasques de la llar o qualsevol altre cosa</a:t>
+              <a:t>basa en una eina de gestió de projectes i de la teva vida personal que fa la organització molt més fàcil i divertida. La realitat es que serveix per a tot, estiguis organitzant un projecte de treball, tasques de la llar o qualsevol altre cosa</a:t>
             </a:r>
             <a:r>
               <a:rPr lang="ca-ES" dirty="0" smtClean="0"/>
@@ -7298,6 +7310,13 @@
   <p:clrMapOvr>
     <a:masterClrMapping/>
   </p:clrMapOvr>
+  <p:timing>
+    <p:tnLst>
+      <p:par>
+        <p:cTn id="1" dur="indefinite" restart="never" nodeType="tmRoot"/>
+      </p:par>
+    </p:tnLst>
+  </p:timing>
 </p:sld>
 </file>
 

</xml_diff>